<commit_message>
presentation and init result updated
</commit_message>
<xml_diff>
--- a/presentation.pptx
+++ b/presentation.pptx
@@ -128,7 +128,7 @@
 <file path=ppt/revisionInfo.xml><?xml version="1.0" encoding="utf-8"?>
 <p1510:revInfo xmlns:a="http://schemas.openxmlformats.org/drawingml/2006/main" xmlns:r="http://schemas.openxmlformats.org/officeDocument/2006/relationships" xmlns:p1510="http://schemas.microsoft.com/office/powerpoint/2015/10/main">
   <p1510:revLst>
-    <p1510:client id="{5FB6D85F-387C-4971-94F8-FF9EAA426351}" v="86" dt="2023-06-10T08:13:33.541"/>
+    <p1510:client id="{5FB6D85F-387C-4971-94F8-FF9EAA426351}" v="91" dt="2023-06-12T07:25:21.874"/>
   </p1510:revLst>
 </p1510:revInfo>
 </file>
@@ -138,7 +138,7 @@
   <pc:docChgLst>
     <pc:chgData name="ely katz" userId="bd26b9949e3df842" providerId="LiveId" clId="{5FB6D85F-387C-4971-94F8-FF9EAA426351}"/>
     <pc:docChg chg="undo redo custSel addSld modSld sldOrd">
-      <pc:chgData name="ely katz" userId="bd26b9949e3df842" providerId="LiveId" clId="{5FB6D85F-387C-4971-94F8-FF9EAA426351}" dt="2023-06-10T11:10:26.415" v="3010" actId="1076"/>
+      <pc:chgData name="ely katz" userId="bd26b9949e3df842" providerId="LiveId" clId="{5FB6D85F-387C-4971-94F8-FF9EAA426351}" dt="2023-06-12T07:25:21.874" v="3057"/>
       <pc:docMkLst>
         <pc:docMk/>
       </pc:docMkLst>
@@ -1269,22 +1269,62 @@
           </ac:picMkLst>
         </pc:picChg>
       </pc:sldChg>
-      <pc:sldChg chg="addSp modSp mod">
-        <pc:chgData name="ely katz" userId="bd26b9949e3df842" providerId="LiveId" clId="{5FB6D85F-387C-4971-94F8-FF9EAA426351}" dt="2023-06-10T11:10:26.415" v="3010" actId="1076"/>
+      <pc:sldChg chg="addSp delSp modSp mod setBg addAnim delAnim modAnim">
+        <pc:chgData name="ely katz" userId="bd26b9949e3df842" providerId="LiveId" clId="{5FB6D85F-387C-4971-94F8-FF9EAA426351}" dt="2023-06-12T07:25:21.874" v="3057"/>
         <pc:sldMkLst>
           <pc:docMk/>
           <pc:sldMk cId="2918998856" sldId="266"/>
         </pc:sldMkLst>
-        <pc:picChg chg="add mod">
-          <ac:chgData name="ely katz" userId="bd26b9949e3df842" providerId="LiveId" clId="{5FB6D85F-387C-4971-94F8-FF9EAA426351}" dt="2023-06-10T11:09:57.243" v="3007" actId="14100"/>
+        <pc:spChg chg="mod">
+          <ac:chgData name="ely katz" userId="bd26b9949e3df842" providerId="LiveId" clId="{5FB6D85F-387C-4971-94F8-FF9EAA426351}" dt="2023-06-12T07:22:04.747" v="3028" actId="26606"/>
+          <ac:spMkLst>
+            <pc:docMk/>
+            <pc:sldMk cId="2918998856" sldId="266"/>
+            <ac:spMk id="2" creationId="{8C88EF07-B77C-98F6-8D42-DFD034C25A53}"/>
+          </ac:spMkLst>
+        </pc:spChg>
+        <pc:spChg chg="mod">
+          <ac:chgData name="ely katz" userId="bd26b9949e3df842" providerId="LiveId" clId="{5FB6D85F-387C-4971-94F8-FF9EAA426351}" dt="2023-06-12T07:23:20.937" v="3044" actId="20577"/>
+          <ac:spMkLst>
+            <pc:docMk/>
+            <pc:sldMk cId="2918998856" sldId="266"/>
+            <ac:spMk id="3" creationId="{8CB72595-9DA8-B443-AA14-56EE15A11BA1}"/>
+          </ac:spMkLst>
+        </pc:spChg>
+        <pc:spChg chg="add del">
+          <ac:chgData name="ely katz" userId="bd26b9949e3df842" providerId="LiveId" clId="{5FB6D85F-387C-4971-94F8-FF9EAA426351}" dt="2023-06-12T06:49:28.068" v="3014"/>
+          <ac:spMkLst>
+            <pc:docMk/>
+            <pc:sldMk cId="2918998856" sldId="266"/>
+            <ac:spMk id="4" creationId="{4CBAD097-CB2F-42A5-B7BF-90DE358A2F3D}"/>
+          </ac:spMkLst>
+        </pc:spChg>
+        <pc:spChg chg="add del">
+          <ac:chgData name="ely katz" userId="bd26b9949e3df842" providerId="LiveId" clId="{5FB6D85F-387C-4971-94F8-FF9EAA426351}" dt="2023-06-12T07:22:04.747" v="3028" actId="26606"/>
+          <ac:spMkLst>
+            <pc:docMk/>
+            <pc:sldMk cId="2918998856" sldId="266"/>
+            <ac:spMk id="22" creationId="{B76622F9-95FA-4AAD-9498-8E3D6C96AF0A}"/>
+          </ac:spMkLst>
+        </pc:spChg>
+        <pc:grpChg chg="add del">
+          <ac:chgData name="ely katz" userId="bd26b9949e3df842" providerId="LiveId" clId="{5FB6D85F-387C-4971-94F8-FF9EAA426351}" dt="2023-06-12T07:22:04.747" v="3028" actId="26606"/>
+          <ac:grpSpMkLst>
+            <pc:docMk/>
+            <pc:sldMk cId="2918998856" sldId="266"/>
+            <ac:grpSpMk id="18" creationId="{FF508BC2-D0E6-462C-8817-CF53BC4DEEFF}"/>
+          </ac:grpSpMkLst>
+        </pc:grpChg>
+        <pc:picChg chg="add del mod">
+          <ac:chgData name="ely katz" userId="bd26b9949e3df842" providerId="LiveId" clId="{5FB6D85F-387C-4971-94F8-FF9EAA426351}" dt="2023-06-12T06:49:25.695" v="3012" actId="478"/>
           <ac:picMkLst>
             <pc:docMk/>
             <pc:sldMk cId="2918998856" sldId="266"/>
             <ac:picMk id="5" creationId="{F0FD07F5-D299-5E00-2F81-0111CE21A151}"/>
           </ac:picMkLst>
         </pc:picChg>
-        <pc:picChg chg="add mod">
-          <ac:chgData name="ely katz" userId="bd26b9949e3df842" providerId="LiveId" clId="{5FB6D85F-387C-4971-94F8-FF9EAA426351}" dt="2023-06-10T11:09:52.164" v="3006" actId="1076"/>
+        <pc:picChg chg="add del mod">
+          <ac:chgData name="ely katz" userId="bd26b9949e3df842" providerId="LiveId" clId="{5FB6D85F-387C-4971-94F8-FF9EAA426351}" dt="2023-06-12T06:52:37.950" v="3019" actId="478"/>
           <ac:picMkLst>
             <pc:docMk/>
             <pc:sldMk cId="2918998856" sldId="266"/>
@@ -1292,11 +1332,43 @@
           </ac:picMkLst>
         </pc:picChg>
         <pc:picChg chg="add mod">
-          <ac:chgData name="ely katz" userId="bd26b9949e3df842" providerId="LiveId" clId="{5FB6D85F-387C-4971-94F8-FF9EAA426351}" dt="2023-06-10T11:10:26.415" v="3010" actId="1076"/>
+          <ac:chgData name="ely katz" userId="bd26b9949e3df842" providerId="LiveId" clId="{5FB6D85F-387C-4971-94F8-FF9EAA426351}" dt="2023-06-12T07:24:11.275" v="3048" actId="14100"/>
+          <ac:picMkLst>
+            <pc:docMk/>
+            <pc:sldMk cId="2918998856" sldId="266"/>
+            <ac:picMk id="8" creationId="{22E548C1-6DCA-336E-0D66-9BC47D7147DB}"/>
+          </ac:picMkLst>
+        </pc:picChg>
+        <pc:picChg chg="add del mod">
+          <ac:chgData name="ely katz" userId="bd26b9949e3df842" providerId="LiveId" clId="{5FB6D85F-387C-4971-94F8-FF9EAA426351}" dt="2023-06-12T07:16:58.119" v="3022" actId="478"/>
           <ac:picMkLst>
             <pc:docMk/>
             <pc:sldMk cId="2918998856" sldId="266"/>
             <ac:picMk id="9" creationId="{4B89E6A1-A60B-9858-98BC-45F340F74880}"/>
+          </ac:picMkLst>
+        </pc:picChg>
+        <pc:picChg chg="add mod">
+          <ac:chgData name="ely katz" userId="bd26b9949e3df842" providerId="LiveId" clId="{5FB6D85F-387C-4971-94F8-FF9EAA426351}" dt="2023-06-12T07:24:59.454" v="3052" actId="1076"/>
+          <ac:picMkLst>
+            <pc:docMk/>
+            <pc:sldMk cId="2918998856" sldId="266"/>
+            <ac:picMk id="11" creationId="{E6090401-C62D-5AED-E9B1-010D60652530}"/>
+          </ac:picMkLst>
+        </pc:picChg>
+        <pc:picChg chg="add mod ord">
+          <ac:chgData name="ely katz" userId="bd26b9949e3df842" providerId="LiveId" clId="{5FB6D85F-387C-4971-94F8-FF9EAA426351}" dt="2023-06-12T07:25:20.427" v="3056" actId="1076"/>
+          <ac:picMkLst>
+            <pc:docMk/>
+            <pc:sldMk cId="2918998856" sldId="266"/>
+            <ac:picMk id="13" creationId="{0D8037FC-427E-5893-882E-B69B04BB7375}"/>
+          </ac:picMkLst>
+        </pc:picChg>
+        <pc:picChg chg="add del">
+          <ac:chgData name="ely katz" userId="bd26b9949e3df842" providerId="LiveId" clId="{5FB6D85F-387C-4971-94F8-FF9EAA426351}" dt="2023-06-12T07:22:04.747" v="3028" actId="26606"/>
+          <ac:picMkLst>
+            <pc:docMk/>
+            <pc:sldMk cId="2918998856" sldId="266"/>
+            <ac:picMk id="24" creationId="{DFD6E812-7831-40CE-93CF-E0EBB8521175}"/>
           </ac:picMkLst>
         </pc:picChg>
       </pc:sldChg>
@@ -1474,7 +1546,7 @@
           <a:p>
             <a:fld id="{1C7B009D-A6E5-414E-BB91-A276F1AC16EF}" type="datetimeFigureOut">
               <a:rPr lang="en-IL" smtClean="0"/>
-              <a:t>10/06/2023</a:t>
+              <a:t>12/06/2023</a:t>
             </a:fld>
             <a:endParaRPr lang="en-IL"/>
           </a:p>
@@ -2341,7 +2413,7 @@
           <a:p>
             <a:fld id="{507718B8-419B-44F1-A15C-DCE6E89441DE}" type="datetimeFigureOut">
               <a:rPr lang="he-IL" smtClean="0"/>
-              <a:t>כ"א/סיון/תשפ"ג</a:t>
+              <a:t>כ"ג/סיון/תשפ"ג</a:t>
             </a:fld>
             <a:endParaRPr lang="he-IL"/>
           </a:p>
@@ -2755,7 +2827,7 @@
           <a:p>
             <a:fld id="{507718B8-419B-44F1-A15C-DCE6E89441DE}" type="datetimeFigureOut">
               <a:rPr lang="he-IL" smtClean="0"/>
-              <a:t>כ"א/סיון/תשפ"ג</a:t>
+              <a:t>כ"ג/סיון/תשפ"ג</a:t>
             </a:fld>
             <a:endParaRPr lang="he-IL"/>
           </a:p>
@@ -3091,7 +3163,7 @@
           <a:p>
             <a:fld id="{507718B8-419B-44F1-A15C-DCE6E89441DE}" type="datetimeFigureOut">
               <a:rPr lang="he-IL" smtClean="0"/>
-              <a:t>כ"א/סיון/תשפ"ג</a:t>
+              <a:t>כ"ג/סיון/תשפ"ג</a:t>
             </a:fld>
             <a:endParaRPr lang="he-IL"/>
           </a:p>
@@ -3496,7 +3568,7 @@
           <a:p>
             <a:fld id="{507718B8-419B-44F1-A15C-DCE6E89441DE}" type="datetimeFigureOut">
               <a:rPr lang="he-IL" smtClean="0"/>
-              <a:t>כ"א/סיון/תשפ"ג</a:t>
+              <a:t>כ"ג/סיון/תשפ"ג</a:t>
             </a:fld>
             <a:endParaRPr lang="he-IL"/>
           </a:p>
@@ -4064,7 +4136,7 @@
           <a:p>
             <a:fld id="{507718B8-419B-44F1-A15C-DCE6E89441DE}" type="datetimeFigureOut">
               <a:rPr lang="he-IL" smtClean="0"/>
-              <a:t>כ"א/סיון/תשפ"ג</a:t>
+              <a:t>כ"ג/סיון/תשפ"ג</a:t>
             </a:fld>
             <a:endParaRPr lang="he-IL"/>
           </a:p>
@@ -4745,7 +4817,7 @@
           <a:p>
             <a:fld id="{507718B8-419B-44F1-A15C-DCE6E89441DE}" type="datetimeFigureOut">
               <a:rPr lang="he-IL" smtClean="0"/>
-              <a:t>כ"א/סיון/תשפ"ג</a:t>
+              <a:t>כ"ג/סיון/תשפ"ג</a:t>
             </a:fld>
             <a:endParaRPr lang="he-IL"/>
           </a:p>
@@ -5658,7 +5730,7 @@
           <a:p>
             <a:fld id="{507718B8-419B-44F1-A15C-DCE6E89441DE}" type="datetimeFigureOut">
               <a:rPr lang="he-IL" smtClean="0"/>
-              <a:t>כ"א/סיון/תשפ"ג</a:t>
+              <a:t>כ"ג/סיון/תשפ"ג</a:t>
             </a:fld>
             <a:endParaRPr lang="he-IL"/>
           </a:p>
@@ -5971,7 +6043,7 @@
           <a:p>
             <a:fld id="{507718B8-419B-44F1-A15C-DCE6E89441DE}" type="datetimeFigureOut">
               <a:rPr lang="he-IL" smtClean="0"/>
-              <a:t>כ"א/סיון/תשפ"ג</a:t>
+              <a:t>כ"ג/סיון/תשפ"ג</a:t>
             </a:fld>
             <a:endParaRPr lang="he-IL"/>
           </a:p>
@@ -6235,7 +6307,7 @@
           <a:p>
             <a:fld id="{507718B8-419B-44F1-A15C-DCE6E89441DE}" type="datetimeFigureOut">
               <a:rPr lang="he-IL" smtClean="0"/>
-              <a:t>כ"א/סיון/תשפ"ג</a:t>
+              <a:t>כ"ג/סיון/תשפ"ג</a:t>
             </a:fld>
             <a:endParaRPr lang="he-IL"/>
           </a:p>
@@ -6558,7 +6630,7 @@
           <a:p>
             <a:fld id="{507718B8-419B-44F1-A15C-DCE6E89441DE}" type="datetimeFigureOut">
               <a:rPr lang="he-IL" smtClean="0"/>
-              <a:t>כ"א/סיון/תשפ"ג</a:t>
+              <a:t>כ"ג/סיון/תשפ"ג</a:t>
             </a:fld>
             <a:endParaRPr lang="he-IL"/>
           </a:p>
@@ -6947,7 +7019,7 @@
           <a:p>
             <a:fld id="{507718B8-419B-44F1-A15C-DCE6E89441DE}" type="datetimeFigureOut">
               <a:rPr lang="he-IL" smtClean="0"/>
-              <a:t>כ"א/סיון/תשפ"ג</a:t>
+              <a:t>כ"ג/סיון/תשפ"ג</a:t>
             </a:fld>
             <a:endParaRPr lang="he-IL"/>
           </a:p>
@@ -7323,7 +7395,7 @@
           <a:p>
             <a:fld id="{507718B8-419B-44F1-A15C-DCE6E89441DE}" type="datetimeFigureOut">
               <a:rPr lang="he-IL" smtClean="0"/>
-              <a:t>כ"א/סיון/תשפ"ג</a:t>
+              <a:t>כ"ג/סיון/תשפ"ג</a:t>
             </a:fld>
             <a:endParaRPr lang="he-IL"/>
           </a:p>
@@ -7829,7 +7901,7 @@
           <a:p>
             <a:fld id="{507718B8-419B-44F1-A15C-DCE6E89441DE}" type="datetimeFigureOut">
               <a:rPr lang="he-IL" smtClean="0"/>
-              <a:t>כ"א/סיון/תשפ"ג</a:t>
+              <a:t>כ"ג/סיון/תשפ"ג</a:t>
             </a:fld>
             <a:endParaRPr lang="he-IL"/>
           </a:p>
@@ -8086,7 +8158,7 @@
           <a:p>
             <a:fld id="{507718B8-419B-44F1-A15C-DCE6E89441DE}" type="datetimeFigureOut">
               <a:rPr lang="he-IL" smtClean="0"/>
-              <a:t>כ"א/סיון/תשפ"ג</a:t>
+              <a:t>כ"ג/סיון/תשפ"ג</a:t>
             </a:fld>
             <a:endParaRPr lang="he-IL"/>
           </a:p>
@@ -8249,7 +8321,7 @@
           <a:p>
             <a:fld id="{507718B8-419B-44F1-A15C-DCE6E89441DE}" type="datetimeFigureOut">
               <a:rPr lang="he-IL" smtClean="0"/>
-              <a:t>כ"א/סיון/תשפ"ג</a:t>
+              <a:t>כ"ג/סיון/תשפ"ג</a:t>
             </a:fld>
             <a:endParaRPr lang="he-IL"/>
           </a:p>
@@ -8639,7 +8711,7 @@
           <a:p>
             <a:fld id="{507718B8-419B-44F1-A15C-DCE6E89441DE}" type="datetimeFigureOut">
               <a:rPr lang="he-IL" smtClean="0"/>
-              <a:t>כ"א/סיון/תשפ"ג</a:t>
+              <a:t>כ"ג/סיון/תשפ"ג</a:t>
             </a:fld>
             <a:endParaRPr lang="he-IL"/>
           </a:p>
@@ -9048,7 +9120,7 @@
           <a:p>
             <a:fld id="{507718B8-419B-44F1-A15C-DCE6E89441DE}" type="datetimeFigureOut">
               <a:rPr lang="he-IL" smtClean="0"/>
-              <a:t>כ"א/סיון/תשפ"ג</a:t>
+              <a:t>כ"ג/סיון/תשפ"ג</a:t>
             </a:fld>
             <a:endParaRPr lang="he-IL"/>
           </a:p>
@@ -9292,7 +9364,7 @@
           <a:p>
             <a:fld id="{507718B8-419B-44F1-A15C-DCE6E89441DE}" type="datetimeFigureOut">
               <a:rPr lang="he-IL" smtClean="0"/>
-              <a:t>כ"א/סיון/תשפ"ג</a:t>
+              <a:t>כ"ג/סיון/תשפ"ג</a:t>
             </a:fld>
             <a:endParaRPr lang="he-IL"/>
           </a:p>
@@ -10577,20 +10649,16 @@
           <a:bodyPr/>
           <a:lstStyle/>
           <a:p>
-            <a:r>
-              <a:rPr lang="en-US" dirty="0"/>
-              <a:t>TBD</a:t>
-            </a:r>
             <a:endParaRPr lang="he-IL" dirty="0"/>
           </a:p>
         </p:txBody>
       </p:sp>
       <p:pic>
         <p:nvPicPr>
-          <p:cNvPr id="5" name="Picture 4">
+          <p:cNvPr id="8" name="Picture 7">
             <a:extLst>
               <a:ext uri="{FF2B5EF4-FFF2-40B4-BE49-F238E27FC236}">
-                <a16:creationId xmlns:a16="http://schemas.microsoft.com/office/drawing/2014/main" id="{F0FD07F5-D299-5E00-2F81-0111CE21A151}"/>
+                <a16:creationId xmlns:a16="http://schemas.microsoft.com/office/drawing/2014/main" id="{22E548C1-6DCA-336E-0D66-9BC47D7147DB}"/>
               </a:ext>
             </a:extLst>
           </p:cNvPr>
@@ -10607,8 +10675,8 @@
         </p:blipFill>
         <p:spPr>
           <a:xfrm>
-            <a:off x="8336640" y="3970751"/>
-            <a:ext cx="3855360" cy="2887249"/>
+            <a:off x="-54402" y="1948284"/>
+            <a:ext cx="7969042" cy="4908206"/>
           </a:xfrm>
           <a:prstGeom prst="rect">
             <a:avLst/>
@@ -10617,10 +10685,10 @@
       </p:pic>
       <p:pic>
         <p:nvPicPr>
-          <p:cNvPr id="7" name="Picture 6">
+          <p:cNvPr id="11" name="Picture 10">
             <a:extLst>
               <a:ext uri="{FF2B5EF4-FFF2-40B4-BE49-F238E27FC236}">
-                <a16:creationId xmlns:a16="http://schemas.microsoft.com/office/drawing/2014/main" id="{E9AD9B48-FD58-0F84-0070-D22F27D1402F}"/>
+                <a16:creationId xmlns:a16="http://schemas.microsoft.com/office/drawing/2014/main" id="{E6090401-C62D-5AED-E9B1-010D60652530}"/>
               </a:ext>
             </a:extLst>
           </p:cNvPr>
@@ -10637,8 +10705,8 @@
         </p:blipFill>
         <p:spPr>
           <a:xfrm>
-            <a:off x="0" y="4075753"/>
-            <a:ext cx="3741069" cy="2782247"/>
+            <a:off x="7914640" y="0"/>
+            <a:ext cx="4263305" cy="3230880"/>
           </a:xfrm>
           <a:prstGeom prst="rect">
             <a:avLst/>
@@ -10647,10 +10715,10 @@
       </p:pic>
       <p:pic>
         <p:nvPicPr>
-          <p:cNvPr id="9" name="Picture 8">
+          <p:cNvPr id="13" name="Picture 12">
             <a:extLst>
               <a:ext uri="{FF2B5EF4-FFF2-40B4-BE49-F238E27FC236}">
-                <a16:creationId xmlns:a16="http://schemas.microsoft.com/office/drawing/2014/main" id="{4B89E6A1-A60B-9858-98BC-45F340F74880}"/>
+                <a16:creationId xmlns:a16="http://schemas.microsoft.com/office/drawing/2014/main" id="{0D8037FC-427E-5893-882E-B69B04BB7375}"/>
               </a:ext>
             </a:extLst>
           </p:cNvPr>
@@ -10667,8 +10735,8 @@
         </p:blipFill>
         <p:spPr>
           <a:xfrm>
-            <a:off x="3915315" y="3632627"/>
-            <a:ext cx="4361370" cy="3238958"/>
+            <a:off x="7914640" y="3241040"/>
+            <a:ext cx="4277361" cy="3647441"/>
           </a:xfrm>
           <a:prstGeom prst="rect">
             <a:avLst/>
@@ -10685,6 +10753,171 @@
   <p:clrMapOvr>
     <a:masterClrMapping/>
   </p:clrMapOvr>
+  <p:timing>
+    <p:tnLst>
+      <p:par>
+        <p:cTn id="1" dur="indefinite" restart="never" nodeType="tmRoot">
+          <p:childTnLst>
+            <p:seq concurrent="1" nextAc="seek">
+              <p:cTn id="2" dur="indefinite" nodeType="mainSeq">
+                <p:childTnLst>
+                  <p:par>
+                    <p:cTn id="3" fill="hold">
+                      <p:stCondLst>
+                        <p:cond delay="indefinite"/>
+                      </p:stCondLst>
+                      <p:childTnLst>
+                        <p:par>
+                          <p:cTn id="4" fill="hold">
+                            <p:stCondLst>
+                              <p:cond delay="0"/>
+                            </p:stCondLst>
+                            <p:childTnLst>
+                              <p:par>
+                                <p:cTn id="5" presetID="1" presetClass="entr" presetSubtype="0" fill="hold" nodeType="clickEffect">
+                                  <p:stCondLst>
+                                    <p:cond delay="0"/>
+                                  </p:stCondLst>
+                                  <p:childTnLst>
+                                    <p:set>
+                                      <p:cBhvr>
+                                        <p:cTn id="6" dur="1" fill="hold">
+                                          <p:stCondLst>
+                                            <p:cond delay="0"/>
+                                          </p:stCondLst>
+                                        </p:cTn>
+                                        <p:tgtEl>
+                                          <p:spTgt spid="8"/>
+                                        </p:tgtEl>
+                                        <p:attrNameLst>
+                                          <p:attrName>style.visibility</p:attrName>
+                                        </p:attrNameLst>
+                                      </p:cBhvr>
+                                      <p:to>
+                                        <p:strVal val="visible"/>
+                                      </p:to>
+                                    </p:set>
+                                  </p:childTnLst>
+                                </p:cTn>
+                              </p:par>
+                            </p:childTnLst>
+                          </p:cTn>
+                        </p:par>
+                      </p:childTnLst>
+                    </p:cTn>
+                  </p:par>
+                  <p:par>
+                    <p:cTn id="7" fill="hold">
+                      <p:stCondLst>
+                        <p:cond delay="indefinite"/>
+                      </p:stCondLst>
+                      <p:childTnLst>
+                        <p:par>
+                          <p:cTn id="8" fill="hold">
+                            <p:stCondLst>
+                              <p:cond delay="0"/>
+                            </p:stCondLst>
+                            <p:childTnLst>
+                              <p:par>
+                                <p:cTn id="9" presetID="1" presetClass="entr" presetSubtype="0" fill="hold" nodeType="clickEffect">
+                                  <p:stCondLst>
+                                    <p:cond delay="0"/>
+                                  </p:stCondLst>
+                                  <p:childTnLst>
+                                    <p:set>
+                                      <p:cBhvr>
+                                        <p:cTn id="10" dur="1" fill="hold">
+                                          <p:stCondLst>
+                                            <p:cond delay="0"/>
+                                          </p:stCondLst>
+                                        </p:cTn>
+                                        <p:tgtEl>
+                                          <p:spTgt spid="11"/>
+                                        </p:tgtEl>
+                                        <p:attrNameLst>
+                                          <p:attrName>style.visibility</p:attrName>
+                                        </p:attrNameLst>
+                                      </p:cBhvr>
+                                      <p:to>
+                                        <p:strVal val="visible"/>
+                                      </p:to>
+                                    </p:set>
+                                  </p:childTnLst>
+                                </p:cTn>
+                              </p:par>
+                            </p:childTnLst>
+                          </p:cTn>
+                        </p:par>
+                      </p:childTnLst>
+                    </p:cTn>
+                  </p:par>
+                  <p:par>
+                    <p:cTn id="11" fill="hold">
+                      <p:stCondLst>
+                        <p:cond delay="indefinite"/>
+                      </p:stCondLst>
+                      <p:childTnLst>
+                        <p:par>
+                          <p:cTn id="12" fill="hold">
+                            <p:stCondLst>
+                              <p:cond delay="0"/>
+                            </p:stCondLst>
+                            <p:childTnLst>
+                              <p:par>
+                                <p:cTn id="13" presetID="1" presetClass="entr" presetSubtype="0" fill="hold" nodeType="clickEffect">
+                                  <p:stCondLst>
+                                    <p:cond delay="0"/>
+                                  </p:stCondLst>
+                                  <p:childTnLst>
+                                    <p:set>
+                                      <p:cBhvr>
+                                        <p:cTn id="14" dur="1" fill="hold">
+                                          <p:stCondLst>
+                                            <p:cond delay="0"/>
+                                          </p:stCondLst>
+                                        </p:cTn>
+                                        <p:tgtEl>
+                                          <p:spTgt spid="13"/>
+                                        </p:tgtEl>
+                                        <p:attrNameLst>
+                                          <p:attrName>style.visibility</p:attrName>
+                                        </p:attrNameLst>
+                                      </p:cBhvr>
+                                      <p:to>
+                                        <p:strVal val="visible"/>
+                                      </p:to>
+                                    </p:set>
+                                  </p:childTnLst>
+                                </p:cTn>
+                              </p:par>
+                            </p:childTnLst>
+                          </p:cTn>
+                        </p:par>
+                      </p:childTnLst>
+                    </p:cTn>
+                  </p:par>
+                </p:childTnLst>
+              </p:cTn>
+              <p:prevCondLst>
+                <p:cond evt="onPrev" delay="0">
+                  <p:tgtEl>
+                    <p:sldTgt/>
+                  </p:tgtEl>
+                </p:cond>
+              </p:prevCondLst>
+              <p:nextCondLst>
+                <p:cond evt="onNext" delay="0">
+                  <p:tgtEl>
+                    <p:sldTgt/>
+                  </p:tgtEl>
+                </p:cond>
+              </p:nextCondLst>
+            </p:seq>
+          </p:childTnLst>
+        </p:cTn>
+      </p:par>
+    </p:tnLst>
+  </p:timing>
 </p:sld>
 </file>
 

</xml_diff>

<commit_message>
added knesset speakers function
</commit_message>
<xml_diff>
--- a/presentation.pptx
+++ b/presentation.pptx
@@ -138,12 +138,12 @@
   <pc:docChgLst>
     <pc:chgData name="ely katz" userId="bd26b9949e3df842" providerId="LiveId" clId="{5FB6D85F-387C-4971-94F8-FF9EAA426351}"/>
     <pc:docChg chg="undo redo custSel addSld modSld sldOrd">
-      <pc:chgData name="ely katz" userId="bd26b9949e3df842" providerId="LiveId" clId="{5FB6D85F-387C-4971-94F8-FF9EAA426351}" dt="2023-06-12T07:25:21.874" v="3057"/>
+      <pc:chgData name="ely katz" userId="bd26b9949e3df842" providerId="LiveId" clId="{5FB6D85F-387C-4971-94F8-FF9EAA426351}" dt="2023-06-14T11:23:52.701" v="3060"/>
       <pc:docMkLst>
         <pc:docMk/>
       </pc:docMkLst>
       <pc:sldChg chg="addSp delSp modSp mod setBg setClrOvrMap delDesignElem">
-        <pc:chgData name="ely katz" userId="bd26b9949e3df842" providerId="LiveId" clId="{5FB6D85F-387C-4971-94F8-FF9EAA426351}" dt="2023-06-06T17:01:49.036" v="92" actId="14100"/>
+        <pc:chgData name="ely katz" userId="bd26b9949e3df842" providerId="LiveId" clId="{5FB6D85F-387C-4971-94F8-FF9EAA426351}" dt="2023-06-14T11:23:52.701" v="3060"/>
         <pc:sldMkLst>
           <pc:docMk/>
           <pc:sldMk cId="2416624865" sldId="256"/>
@@ -156,8 +156,8 @@
             <ac:spMk id="2" creationId="{D74E2DEC-D225-508A-8300-DCAE9518E327}"/>
           </ac:spMkLst>
         </pc:spChg>
-        <pc:spChg chg="mod">
-          <ac:chgData name="ely katz" userId="bd26b9949e3df842" providerId="LiveId" clId="{5FB6D85F-387C-4971-94F8-FF9EAA426351}" dt="2023-06-06T17:00:06.990" v="43" actId="207"/>
+        <pc:spChg chg="del mod">
+          <ac:chgData name="ely katz" userId="bd26b9949e3df842" providerId="LiveId" clId="{5FB6D85F-387C-4971-94F8-FF9EAA426351}" dt="2023-06-14T11:23:52.701" v="3060"/>
           <ac:spMkLst>
             <pc:docMk/>
             <pc:sldMk cId="2416624865" sldId="256"/>
@@ -1546,7 +1546,7 @@
           <a:p>
             <a:fld id="{1C7B009D-A6E5-414E-BB91-A276F1AC16EF}" type="datetimeFigureOut">
               <a:rPr lang="en-IL" smtClean="0"/>
-              <a:t>12/06/2023</a:t>
+              <a:t>14/06/2023</a:t>
             </a:fld>
             <a:endParaRPr lang="en-IL"/>
           </a:p>
@@ -2413,7 +2413,7 @@
           <a:p>
             <a:fld id="{507718B8-419B-44F1-A15C-DCE6E89441DE}" type="datetimeFigureOut">
               <a:rPr lang="he-IL" smtClean="0"/>
-              <a:t>כ"ג/סיון/תשפ"ג</a:t>
+              <a:t>כ"ה/סיון/תשפ"ג</a:t>
             </a:fld>
             <a:endParaRPr lang="he-IL"/>
           </a:p>
@@ -2827,7 +2827,7 @@
           <a:p>
             <a:fld id="{507718B8-419B-44F1-A15C-DCE6E89441DE}" type="datetimeFigureOut">
               <a:rPr lang="he-IL" smtClean="0"/>
-              <a:t>כ"ג/סיון/תשפ"ג</a:t>
+              <a:t>כ"ה/סיון/תשפ"ג</a:t>
             </a:fld>
             <a:endParaRPr lang="he-IL"/>
           </a:p>
@@ -3163,7 +3163,7 @@
           <a:p>
             <a:fld id="{507718B8-419B-44F1-A15C-DCE6E89441DE}" type="datetimeFigureOut">
               <a:rPr lang="he-IL" smtClean="0"/>
-              <a:t>כ"ג/סיון/תשפ"ג</a:t>
+              <a:t>כ"ה/סיון/תשפ"ג</a:t>
             </a:fld>
             <a:endParaRPr lang="he-IL"/>
           </a:p>
@@ -3568,7 +3568,7 @@
           <a:p>
             <a:fld id="{507718B8-419B-44F1-A15C-DCE6E89441DE}" type="datetimeFigureOut">
               <a:rPr lang="he-IL" smtClean="0"/>
-              <a:t>כ"ג/סיון/תשפ"ג</a:t>
+              <a:t>כ"ה/סיון/תשפ"ג</a:t>
             </a:fld>
             <a:endParaRPr lang="he-IL"/>
           </a:p>
@@ -4136,7 +4136,7 @@
           <a:p>
             <a:fld id="{507718B8-419B-44F1-A15C-DCE6E89441DE}" type="datetimeFigureOut">
               <a:rPr lang="he-IL" smtClean="0"/>
-              <a:t>כ"ג/סיון/תשפ"ג</a:t>
+              <a:t>כ"ה/סיון/תשפ"ג</a:t>
             </a:fld>
             <a:endParaRPr lang="he-IL"/>
           </a:p>
@@ -4817,7 +4817,7 @@
           <a:p>
             <a:fld id="{507718B8-419B-44F1-A15C-DCE6E89441DE}" type="datetimeFigureOut">
               <a:rPr lang="he-IL" smtClean="0"/>
-              <a:t>כ"ג/סיון/תשפ"ג</a:t>
+              <a:t>כ"ה/סיון/תשפ"ג</a:t>
             </a:fld>
             <a:endParaRPr lang="he-IL"/>
           </a:p>
@@ -5730,7 +5730,7 @@
           <a:p>
             <a:fld id="{507718B8-419B-44F1-A15C-DCE6E89441DE}" type="datetimeFigureOut">
               <a:rPr lang="he-IL" smtClean="0"/>
-              <a:t>כ"ג/סיון/תשפ"ג</a:t>
+              <a:t>כ"ה/סיון/תשפ"ג</a:t>
             </a:fld>
             <a:endParaRPr lang="he-IL"/>
           </a:p>
@@ -6043,7 +6043,7 @@
           <a:p>
             <a:fld id="{507718B8-419B-44F1-A15C-DCE6E89441DE}" type="datetimeFigureOut">
               <a:rPr lang="he-IL" smtClean="0"/>
-              <a:t>כ"ג/סיון/תשפ"ג</a:t>
+              <a:t>כ"ה/סיון/תשפ"ג</a:t>
             </a:fld>
             <a:endParaRPr lang="he-IL"/>
           </a:p>
@@ -6307,7 +6307,7 @@
           <a:p>
             <a:fld id="{507718B8-419B-44F1-A15C-DCE6E89441DE}" type="datetimeFigureOut">
               <a:rPr lang="he-IL" smtClean="0"/>
-              <a:t>כ"ג/סיון/תשפ"ג</a:t>
+              <a:t>כ"ה/סיון/תשפ"ג</a:t>
             </a:fld>
             <a:endParaRPr lang="he-IL"/>
           </a:p>
@@ -6630,7 +6630,7 @@
           <a:p>
             <a:fld id="{507718B8-419B-44F1-A15C-DCE6E89441DE}" type="datetimeFigureOut">
               <a:rPr lang="he-IL" smtClean="0"/>
-              <a:t>כ"ג/סיון/תשפ"ג</a:t>
+              <a:t>כ"ה/סיון/תשפ"ג</a:t>
             </a:fld>
             <a:endParaRPr lang="he-IL"/>
           </a:p>
@@ -7019,7 +7019,7 @@
           <a:p>
             <a:fld id="{507718B8-419B-44F1-A15C-DCE6E89441DE}" type="datetimeFigureOut">
               <a:rPr lang="he-IL" smtClean="0"/>
-              <a:t>כ"ג/סיון/תשפ"ג</a:t>
+              <a:t>כ"ה/סיון/תשפ"ג</a:t>
             </a:fld>
             <a:endParaRPr lang="he-IL"/>
           </a:p>
@@ -7395,7 +7395,7 @@
           <a:p>
             <a:fld id="{507718B8-419B-44F1-A15C-DCE6E89441DE}" type="datetimeFigureOut">
               <a:rPr lang="he-IL" smtClean="0"/>
-              <a:t>כ"ג/סיון/תשפ"ג</a:t>
+              <a:t>כ"ה/סיון/תשפ"ג</a:t>
             </a:fld>
             <a:endParaRPr lang="he-IL"/>
           </a:p>
@@ -7901,7 +7901,7 @@
           <a:p>
             <a:fld id="{507718B8-419B-44F1-A15C-DCE6E89441DE}" type="datetimeFigureOut">
               <a:rPr lang="he-IL" smtClean="0"/>
-              <a:t>כ"ג/סיון/תשפ"ג</a:t>
+              <a:t>כ"ה/סיון/תשפ"ג</a:t>
             </a:fld>
             <a:endParaRPr lang="he-IL"/>
           </a:p>
@@ -8158,7 +8158,7 @@
           <a:p>
             <a:fld id="{507718B8-419B-44F1-A15C-DCE6E89441DE}" type="datetimeFigureOut">
               <a:rPr lang="he-IL" smtClean="0"/>
-              <a:t>כ"ג/סיון/תשפ"ג</a:t>
+              <a:t>כ"ה/סיון/תשפ"ג</a:t>
             </a:fld>
             <a:endParaRPr lang="he-IL"/>
           </a:p>
@@ -8321,7 +8321,7 @@
           <a:p>
             <a:fld id="{507718B8-419B-44F1-A15C-DCE6E89441DE}" type="datetimeFigureOut">
               <a:rPr lang="he-IL" smtClean="0"/>
-              <a:t>כ"ג/סיון/תשפ"ג</a:t>
+              <a:t>כ"ה/סיון/תשפ"ג</a:t>
             </a:fld>
             <a:endParaRPr lang="he-IL"/>
           </a:p>
@@ -8711,7 +8711,7 @@
           <a:p>
             <a:fld id="{507718B8-419B-44F1-A15C-DCE6E89441DE}" type="datetimeFigureOut">
               <a:rPr lang="he-IL" smtClean="0"/>
-              <a:t>כ"ג/סיון/תשפ"ג</a:t>
+              <a:t>כ"ה/סיון/תשפ"ג</a:t>
             </a:fld>
             <a:endParaRPr lang="he-IL"/>
           </a:p>
@@ -9120,7 +9120,7 @@
           <a:p>
             <a:fld id="{507718B8-419B-44F1-A15C-DCE6E89441DE}" type="datetimeFigureOut">
               <a:rPr lang="he-IL" smtClean="0"/>
-              <a:t>כ"ג/סיון/תשפ"ג</a:t>
+              <a:t>כ"ה/סיון/תשפ"ג</a:t>
             </a:fld>
             <a:endParaRPr lang="he-IL"/>
           </a:p>
@@ -9364,7 +9364,7 @@
           <a:p>
             <a:fld id="{507718B8-419B-44F1-A15C-DCE6E89441DE}" type="datetimeFigureOut">
               <a:rPr lang="he-IL" smtClean="0"/>
-              <a:t>כ"ג/סיון/תשפ"ג</a:t>
+              <a:t>כ"ה/סיון/תשפ"ג</a:t>
             </a:fld>
             <a:endParaRPr lang="he-IL"/>
           </a:p>
@@ -10125,74 +10125,6 @@
             <a:schemeClr val="lt1"/>
           </a:fontRef>
         </p:style>
-      </p:sp>
-      <p:sp>
-        <p:nvSpPr>
-          <p:cNvPr id="4" name="מלבן 3">
-            <a:extLst>
-              <a:ext uri="{FF2B5EF4-FFF2-40B4-BE49-F238E27FC236}">
-                <a16:creationId xmlns:a16="http://schemas.microsoft.com/office/drawing/2014/main" id="{BEA4C839-DB17-376B-3F68-3B63DB8C35EC}"/>
-              </a:ext>
-            </a:extLst>
-          </p:cNvPr>
-          <p:cNvSpPr/>
-          <p:nvPr/>
-        </p:nvSpPr>
-        <p:spPr>
-          <a:xfrm>
-            <a:off x="5079309" y="609600"/>
-            <a:ext cx="1973618" cy="677878"/>
-          </a:xfrm>
-          <a:prstGeom prst="rect">
-            <a:avLst/>
-          </a:prstGeom>
-          <a:noFill/>
-        </p:spPr>
-        <p:txBody>
-          <a:bodyPr wrap="none" lIns="91440" tIns="45720" rIns="91440" bIns="45720">
-            <a:spAutoFit/>
-          </a:bodyPr>
-          <a:lstStyle/>
-          <a:p>
-            <a:pPr algn="ctr" defTabSz="322091">
-              <a:spcAft>
-                <a:spcPts val="454"/>
-              </a:spcAft>
-            </a:pPr>
-            <a:r>
-              <a:rPr lang="en-US" sz="3805" kern="1200" dirty="0" err="1">
-                <a:ln w="0"/>
-                <a:solidFill>
-                  <a:schemeClr val="bg1"/>
-                </a:solidFill>
-                <a:effectLst>
-                  <a:outerShdw blurRad="38100" dist="19050" dir="2700000" algn="tl" rotWithShape="0">
-                    <a:schemeClr val="dk1">
-                      <a:alpha val="40000"/>
-                    </a:schemeClr>
-                  </a:outerShdw>
-                </a:effectLst>
-                <a:latin typeface="+mn-lt"/>
-                <a:ea typeface="+mn-ea"/>
-                <a:cs typeface="+mn-cs"/>
-              </a:rPr>
-              <a:t>AutoAgg</a:t>
-            </a:r>
-            <a:endParaRPr lang="he-IL" sz="5400" b="0" cap="none" spc="0" dirty="0">
-              <a:ln w="0"/>
-              <a:solidFill>
-                <a:schemeClr val="bg1"/>
-              </a:solidFill>
-              <a:effectLst>
-                <a:outerShdw blurRad="38100" dist="19050" dir="2700000" algn="tl" rotWithShape="0">
-                  <a:schemeClr val="dk1">
-                    <a:alpha val="40000"/>
-                  </a:schemeClr>
-                </a:outerShdw>
-              </a:effectLst>
-            </a:endParaRPr>
-          </a:p>
-        </p:txBody>
       </p:sp>
       <p:sp>
         <p:nvSpPr>

</xml_diff>